<commit_message>
first run of the flask api with images in themes page
</commit_message>
<xml_diff>
--- a/themes/theme1.pptx
+++ b/themes/theme1.pptx
@@ -2,7 +2,7 @@
 <file path=ppt/presentation.xml><?xml version="1.0" encoding="utf-8"?>
 <p:presentation xmlns:a="http://schemas.openxmlformats.org/drawingml/2006/main" xmlns:r="http://schemas.openxmlformats.org/officeDocument/2006/relationships" xmlns:p="http://schemas.openxmlformats.org/presentationml/2006/main" saveSubsetFonts="1">
   <p:sldMasterIdLst>
-    <p:sldMasterId id="2147483660" r:id="rId1"/>
+    <p:sldMasterId id="2147483690" r:id="rId1"/>
   </p:sldMasterIdLst>
   <p:sldIdLst>
     <p:sldId id="256" r:id="rId2"/>
@@ -249,9 +249,9 @@
           <a:bodyPr/>
           <a:lstStyle/>
           <a:p>
-            <a:fld id="{DE1C6FF9-766B-4EA1-9B55-0A10F93297C0}" type="datetimeFigureOut">
+            <a:fld id="{AA69BB30-8325-4345-8DFA-998A30CB2488}" type="datetimeFigureOut">
               <a:rPr lang="en-US" smtClean="0"/>
-              <a:t>9/9/2025</a:t>
+              <a:t>9/11/2025</a:t>
             </a:fld>
             <a:endParaRPr lang="en-US"/>
           </a:p>
@@ -301,7 +301,7 @@
           <a:bodyPr/>
           <a:lstStyle/>
           <a:p>
-            <a:fld id="{1E7C8104-74DF-45D5-8E3E-59CA042D9238}" type="slidenum">
+            <a:fld id="{FDFB9C32-4155-43F0-9D69-97C79EB91DC0}" type="slidenum">
               <a:rPr lang="en-US" smtClean="0"/>
               <a:t>‹#›</a:t>
             </a:fld>
@@ -343,7 +343,7 @@
     </p:spTree>
     <p:extLst>
       <p:ext uri="{BB962C8B-B14F-4D97-AF65-F5344CB8AC3E}">
-        <p14:creationId xmlns:p14="http://schemas.microsoft.com/office/powerpoint/2010/main" val="270922838"/>
+        <p14:creationId xmlns:p14="http://schemas.microsoft.com/office/powerpoint/2010/main" val="1530096003"/>
       </p:ext>
     </p:extLst>
   </p:cSld>
@@ -460,9 +460,9 @@
           <a:bodyPr/>
           <a:lstStyle/>
           <a:p>
-            <a:fld id="{DE1C6FF9-766B-4EA1-9B55-0A10F93297C0}" type="datetimeFigureOut">
+            <a:fld id="{AA69BB30-8325-4345-8DFA-998A30CB2488}" type="datetimeFigureOut">
               <a:rPr lang="en-US" smtClean="0"/>
-              <a:t>9/9/2025</a:t>
+              <a:t>9/11/2025</a:t>
             </a:fld>
             <a:endParaRPr lang="en-US"/>
           </a:p>
@@ -502,7 +502,7 @@
           <a:bodyPr/>
           <a:lstStyle/>
           <a:p>
-            <a:fld id="{1E7C8104-74DF-45D5-8E3E-59CA042D9238}" type="slidenum">
+            <a:fld id="{FDFB9C32-4155-43F0-9D69-97C79EB91DC0}" type="slidenum">
               <a:rPr lang="en-US" smtClean="0"/>
               <a:t>‹#›</a:t>
             </a:fld>
@@ -544,7 +544,7 @@
     </p:spTree>
     <p:extLst>
       <p:ext uri="{BB962C8B-B14F-4D97-AF65-F5344CB8AC3E}">
-        <p14:creationId xmlns:p14="http://schemas.microsoft.com/office/powerpoint/2010/main" val="1289830412"/>
+        <p14:creationId xmlns:p14="http://schemas.microsoft.com/office/powerpoint/2010/main" val="1601824335"/>
       </p:ext>
     </p:extLst>
   </p:cSld>
@@ -675,9 +675,9 @@
           <a:bodyPr/>
           <a:lstStyle/>
           <a:p>
-            <a:fld id="{DE1C6FF9-766B-4EA1-9B55-0A10F93297C0}" type="datetimeFigureOut">
+            <a:fld id="{AA69BB30-8325-4345-8DFA-998A30CB2488}" type="datetimeFigureOut">
               <a:rPr lang="en-US" smtClean="0"/>
-              <a:t>9/9/2025</a:t>
+              <a:t>9/11/2025</a:t>
             </a:fld>
             <a:endParaRPr lang="en-US"/>
           </a:p>
@@ -717,7 +717,7 @@
           <a:bodyPr/>
           <a:lstStyle/>
           <a:p>
-            <a:fld id="{1E7C8104-74DF-45D5-8E3E-59CA042D9238}" type="slidenum">
+            <a:fld id="{FDFB9C32-4155-43F0-9D69-97C79EB91DC0}" type="slidenum">
               <a:rPr lang="en-US" smtClean="0"/>
               <a:t>‹#›</a:t>
             </a:fld>
@@ -759,7 +759,7 @@
     </p:spTree>
     <p:extLst>
       <p:ext uri="{BB962C8B-B14F-4D97-AF65-F5344CB8AC3E}">
-        <p14:creationId xmlns:p14="http://schemas.microsoft.com/office/powerpoint/2010/main" val="3082104971"/>
+        <p14:creationId xmlns:p14="http://schemas.microsoft.com/office/powerpoint/2010/main" val="2501877265"/>
       </p:ext>
     </p:extLst>
   </p:cSld>
@@ -876,9 +876,9 @@
           <a:bodyPr/>
           <a:lstStyle/>
           <a:p>
-            <a:fld id="{DE1C6FF9-766B-4EA1-9B55-0A10F93297C0}" type="datetimeFigureOut">
+            <a:fld id="{AA69BB30-8325-4345-8DFA-998A30CB2488}" type="datetimeFigureOut">
               <a:rPr lang="en-US" smtClean="0"/>
-              <a:t>9/9/2025</a:t>
+              <a:t>9/11/2025</a:t>
             </a:fld>
             <a:endParaRPr lang="en-US"/>
           </a:p>
@@ -918,7 +918,7 @@
           <a:bodyPr/>
           <a:lstStyle/>
           <a:p>
-            <a:fld id="{1E7C8104-74DF-45D5-8E3E-59CA042D9238}" type="slidenum">
+            <a:fld id="{FDFB9C32-4155-43F0-9D69-97C79EB91DC0}" type="slidenum">
               <a:rPr lang="en-US" smtClean="0"/>
               <a:t>‹#›</a:t>
             </a:fld>
@@ -960,7 +960,7 @@
     </p:spTree>
     <p:extLst>
       <p:ext uri="{BB962C8B-B14F-4D97-AF65-F5344CB8AC3E}">
-        <p14:creationId xmlns:p14="http://schemas.microsoft.com/office/powerpoint/2010/main" val="1758593753"/>
+        <p14:creationId xmlns:p14="http://schemas.microsoft.com/office/powerpoint/2010/main" val="1799504466"/>
       </p:ext>
     </p:extLst>
   </p:cSld>
@@ -1155,9 +1155,9 @@
           <a:bodyPr/>
           <a:lstStyle/>
           <a:p>
-            <a:fld id="{DE1C6FF9-766B-4EA1-9B55-0A10F93297C0}" type="datetimeFigureOut">
+            <a:fld id="{AA69BB30-8325-4345-8DFA-998A30CB2488}" type="datetimeFigureOut">
               <a:rPr lang="en-US" smtClean="0"/>
-              <a:t>9/9/2025</a:t>
+              <a:t>9/11/2025</a:t>
             </a:fld>
             <a:endParaRPr lang="en-US"/>
           </a:p>
@@ -1197,7 +1197,7 @@
           <a:bodyPr/>
           <a:lstStyle/>
           <a:p>
-            <a:fld id="{1E7C8104-74DF-45D5-8E3E-59CA042D9238}" type="slidenum">
+            <a:fld id="{FDFB9C32-4155-43F0-9D69-97C79EB91DC0}" type="slidenum">
               <a:rPr lang="en-US" smtClean="0"/>
               <a:t>‹#›</a:t>
             </a:fld>
@@ -1239,7 +1239,7 @@
     </p:spTree>
     <p:extLst>
       <p:ext uri="{BB962C8B-B14F-4D97-AF65-F5344CB8AC3E}">
-        <p14:creationId xmlns:p14="http://schemas.microsoft.com/office/powerpoint/2010/main" val="431203398"/>
+        <p14:creationId xmlns:p14="http://schemas.microsoft.com/office/powerpoint/2010/main" val="1065111681"/>
       </p:ext>
     </p:extLst>
   </p:cSld>
@@ -1423,9 +1423,9 @@
           <a:bodyPr/>
           <a:lstStyle/>
           <a:p>
-            <a:fld id="{DE1C6FF9-766B-4EA1-9B55-0A10F93297C0}" type="datetimeFigureOut">
+            <a:fld id="{AA69BB30-8325-4345-8DFA-998A30CB2488}" type="datetimeFigureOut">
               <a:rPr lang="en-US" smtClean="0"/>
-              <a:t>9/9/2025</a:t>
+              <a:t>9/11/2025</a:t>
             </a:fld>
             <a:endParaRPr lang="en-US"/>
           </a:p>
@@ -1465,7 +1465,7 @@
           <a:bodyPr/>
           <a:lstStyle/>
           <a:p>
-            <a:fld id="{1E7C8104-74DF-45D5-8E3E-59CA042D9238}" type="slidenum">
+            <a:fld id="{FDFB9C32-4155-43F0-9D69-97C79EB91DC0}" type="slidenum">
               <a:rPr lang="en-US" smtClean="0"/>
               <a:t>‹#›</a:t>
             </a:fld>
@@ -1507,7 +1507,7 @@
     </p:spTree>
     <p:extLst>
       <p:ext uri="{BB962C8B-B14F-4D97-AF65-F5344CB8AC3E}">
-        <p14:creationId xmlns:p14="http://schemas.microsoft.com/office/powerpoint/2010/main" val="2387863849"/>
+        <p14:creationId xmlns:p14="http://schemas.microsoft.com/office/powerpoint/2010/main" val="4034210477"/>
       </p:ext>
     </p:extLst>
   </p:cSld>
@@ -1839,9 +1839,9 @@
           <a:bodyPr/>
           <a:lstStyle/>
           <a:p>
-            <a:fld id="{DE1C6FF9-766B-4EA1-9B55-0A10F93297C0}" type="datetimeFigureOut">
+            <a:fld id="{AA69BB30-8325-4345-8DFA-998A30CB2488}" type="datetimeFigureOut">
               <a:rPr lang="en-US" smtClean="0"/>
-              <a:t>9/9/2025</a:t>
+              <a:t>9/11/2025</a:t>
             </a:fld>
             <a:endParaRPr lang="en-US"/>
           </a:p>
@@ -1881,7 +1881,7 @@
           <a:bodyPr/>
           <a:lstStyle/>
           <a:p>
-            <a:fld id="{1E7C8104-74DF-45D5-8E3E-59CA042D9238}" type="slidenum">
+            <a:fld id="{FDFB9C32-4155-43F0-9D69-97C79EB91DC0}" type="slidenum">
               <a:rPr lang="en-US" smtClean="0"/>
               <a:t>‹#›</a:t>
             </a:fld>
@@ -1923,7 +1923,7 @@
     </p:spTree>
     <p:extLst>
       <p:ext uri="{BB962C8B-B14F-4D97-AF65-F5344CB8AC3E}">
-        <p14:creationId xmlns:p14="http://schemas.microsoft.com/office/powerpoint/2010/main" val="418568722"/>
+        <p14:creationId xmlns:p14="http://schemas.microsoft.com/office/powerpoint/2010/main" val="1795881359"/>
       </p:ext>
     </p:extLst>
   </p:cSld>
@@ -1988,9 +1988,9 @@
           <a:bodyPr/>
           <a:lstStyle/>
           <a:p>
-            <a:fld id="{DE1C6FF9-766B-4EA1-9B55-0A10F93297C0}" type="datetimeFigureOut">
+            <a:fld id="{AA69BB30-8325-4345-8DFA-998A30CB2488}" type="datetimeFigureOut">
               <a:rPr lang="en-US" smtClean="0"/>
-              <a:t>9/9/2025</a:t>
+              <a:t>9/11/2025</a:t>
             </a:fld>
             <a:endParaRPr lang="en-US"/>
           </a:p>
@@ -2030,7 +2030,7 @@
           <a:bodyPr/>
           <a:lstStyle/>
           <a:p>
-            <a:fld id="{1E7C8104-74DF-45D5-8E3E-59CA042D9238}" type="slidenum">
+            <a:fld id="{FDFB9C32-4155-43F0-9D69-97C79EB91DC0}" type="slidenum">
               <a:rPr lang="en-US" smtClean="0"/>
               <a:t>‹#›</a:t>
             </a:fld>
@@ -2072,7 +2072,7 @@
     </p:spTree>
     <p:extLst>
       <p:ext uri="{BB962C8B-B14F-4D97-AF65-F5344CB8AC3E}">
-        <p14:creationId xmlns:p14="http://schemas.microsoft.com/office/powerpoint/2010/main" val="2811012960"/>
+        <p14:creationId xmlns:p14="http://schemas.microsoft.com/office/powerpoint/2010/main" val="2856513083"/>
       </p:ext>
     </p:extLst>
   </p:cSld>
@@ -2114,9 +2114,9 @@
           <a:bodyPr/>
           <a:lstStyle/>
           <a:p>
-            <a:fld id="{DE1C6FF9-766B-4EA1-9B55-0A10F93297C0}" type="datetimeFigureOut">
+            <a:fld id="{AA69BB30-8325-4345-8DFA-998A30CB2488}" type="datetimeFigureOut">
               <a:rPr lang="en-US" smtClean="0"/>
-              <a:t>9/9/2025</a:t>
+              <a:t>9/11/2025</a:t>
             </a:fld>
             <a:endParaRPr lang="en-US"/>
           </a:p>
@@ -2156,7 +2156,7 @@
           <a:bodyPr/>
           <a:lstStyle/>
           <a:p>
-            <a:fld id="{1E7C8104-74DF-45D5-8E3E-59CA042D9238}" type="slidenum">
+            <a:fld id="{FDFB9C32-4155-43F0-9D69-97C79EB91DC0}" type="slidenum">
               <a:rPr lang="en-US" smtClean="0"/>
               <a:t>‹#›</a:t>
             </a:fld>
@@ -2167,7 +2167,7 @@
     </p:spTree>
     <p:extLst>
       <p:ext uri="{BB962C8B-B14F-4D97-AF65-F5344CB8AC3E}">
-        <p14:creationId xmlns:p14="http://schemas.microsoft.com/office/powerpoint/2010/main" val="3516730568"/>
+        <p14:creationId xmlns:p14="http://schemas.microsoft.com/office/powerpoint/2010/main" val="1808071708"/>
       </p:ext>
     </p:extLst>
   </p:cSld>
@@ -2365,9 +2365,9 @@
           <a:bodyPr/>
           <a:lstStyle/>
           <a:p>
-            <a:fld id="{DE1C6FF9-766B-4EA1-9B55-0A10F93297C0}" type="datetimeFigureOut">
+            <a:fld id="{AA69BB30-8325-4345-8DFA-998A30CB2488}" type="datetimeFigureOut">
               <a:rPr lang="en-US" smtClean="0"/>
-              <a:t>9/9/2025</a:t>
+              <a:t>9/11/2025</a:t>
             </a:fld>
             <a:endParaRPr lang="en-US"/>
           </a:p>
@@ -2407,7 +2407,7 @@
           <a:bodyPr/>
           <a:lstStyle/>
           <a:p>
-            <a:fld id="{1E7C8104-74DF-45D5-8E3E-59CA042D9238}" type="slidenum">
+            <a:fld id="{FDFB9C32-4155-43F0-9D69-97C79EB91DC0}" type="slidenum">
               <a:rPr lang="en-US" smtClean="0"/>
               <a:t>‹#›</a:t>
             </a:fld>
@@ -2449,7 +2449,7 @@
     </p:spTree>
     <p:extLst>
       <p:ext uri="{BB962C8B-B14F-4D97-AF65-F5344CB8AC3E}">
-        <p14:creationId xmlns:p14="http://schemas.microsoft.com/office/powerpoint/2010/main" val="601558559"/>
+        <p14:creationId xmlns:p14="http://schemas.microsoft.com/office/powerpoint/2010/main" val="2163655855"/>
       </p:ext>
     </p:extLst>
   </p:cSld>
@@ -2810,9 +2810,9 @@
             </a:lvl1pPr>
           </a:lstStyle>
           <a:p>
-            <a:fld id="{DE1C6FF9-766B-4EA1-9B55-0A10F93297C0}" type="datetimeFigureOut">
+            <a:fld id="{AA69BB30-8325-4345-8DFA-998A30CB2488}" type="datetimeFigureOut">
               <a:rPr lang="en-US" smtClean="0"/>
-              <a:t>9/9/2025</a:t>
+              <a:t>9/11/2025</a:t>
             </a:fld>
             <a:endParaRPr lang="en-US"/>
           </a:p>
@@ -2857,7 +2857,7 @@
           <a:bodyPr/>
           <a:lstStyle/>
           <a:p>
-            <a:fld id="{1E7C8104-74DF-45D5-8E3E-59CA042D9238}" type="slidenum">
+            <a:fld id="{FDFB9C32-4155-43F0-9D69-97C79EB91DC0}" type="slidenum">
               <a:rPr lang="en-US" smtClean="0"/>
               <a:t>‹#›</a:t>
             </a:fld>
@@ -2899,7 +2899,7 @@
     </p:spTree>
     <p:extLst>
       <p:ext uri="{BB962C8B-B14F-4D97-AF65-F5344CB8AC3E}">
-        <p14:creationId xmlns:p14="http://schemas.microsoft.com/office/powerpoint/2010/main" val="4294880586"/>
+        <p14:creationId xmlns:p14="http://schemas.microsoft.com/office/powerpoint/2010/main" val="1621168584"/>
       </p:ext>
     </p:extLst>
   </p:cSld>
@@ -3137,9 +3137,9 @@
             </a:lvl1pPr>
           </a:lstStyle>
           <a:p>
-            <a:fld id="{DE1C6FF9-766B-4EA1-9B55-0A10F93297C0}" type="datetimeFigureOut">
+            <a:fld id="{AA69BB30-8325-4345-8DFA-998A30CB2488}" type="datetimeFigureOut">
               <a:rPr lang="en-US" smtClean="0"/>
-              <a:t>9/9/2025</a:t>
+              <a:t>9/11/2025</a:t>
             </a:fld>
             <a:endParaRPr lang="en-US"/>
           </a:p>
@@ -3213,7 +3213,7 @@
             </a:lvl1pPr>
           </a:lstStyle>
           <a:p>
-            <a:fld id="{1E7C8104-74DF-45D5-8E3E-59CA042D9238}" type="slidenum">
+            <a:fld id="{FDFB9C32-4155-43F0-9D69-97C79EB91DC0}" type="slidenum">
               <a:rPr lang="en-US" smtClean="0"/>
               <a:t>‹#›</a:t>
             </a:fld>
@@ -3261,23 +3261,23 @@
     </p:spTree>
     <p:extLst>
       <p:ext uri="{BB962C8B-B14F-4D97-AF65-F5344CB8AC3E}">
-        <p14:creationId xmlns:p14="http://schemas.microsoft.com/office/powerpoint/2010/main" val="3255302400"/>
+        <p14:creationId xmlns:p14="http://schemas.microsoft.com/office/powerpoint/2010/main" val="2695293215"/>
       </p:ext>
     </p:extLst>
   </p:cSld>
   <p:clrMap bg1="lt1" tx1="dk1" bg2="lt2" tx2="dk2" accent1="accent1" accent2="accent2" accent3="accent3" accent4="accent4" accent5="accent5" accent6="accent6" hlink="hlink" folHlink="folHlink"/>
   <p:sldLayoutIdLst>
-    <p:sldLayoutId id="2147483661" r:id="rId1"/>
-    <p:sldLayoutId id="2147483662" r:id="rId2"/>
-    <p:sldLayoutId id="2147483663" r:id="rId3"/>
-    <p:sldLayoutId id="2147483664" r:id="rId4"/>
-    <p:sldLayoutId id="2147483665" r:id="rId5"/>
-    <p:sldLayoutId id="2147483666" r:id="rId6"/>
-    <p:sldLayoutId id="2147483667" r:id="rId7"/>
-    <p:sldLayoutId id="2147483668" r:id="rId8"/>
-    <p:sldLayoutId id="2147483669" r:id="rId9"/>
-    <p:sldLayoutId id="2147483670" r:id="rId10"/>
-    <p:sldLayoutId id="2147483671" r:id="rId11"/>
+    <p:sldLayoutId id="2147483691" r:id="rId1"/>
+    <p:sldLayoutId id="2147483692" r:id="rId2"/>
+    <p:sldLayoutId id="2147483693" r:id="rId3"/>
+    <p:sldLayoutId id="2147483694" r:id="rId4"/>
+    <p:sldLayoutId id="2147483695" r:id="rId5"/>
+    <p:sldLayoutId id="2147483696" r:id="rId6"/>
+    <p:sldLayoutId id="2147483697" r:id="rId7"/>
+    <p:sldLayoutId id="2147483698" r:id="rId8"/>
+    <p:sldLayoutId id="2147483699" r:id="rId9"/>
+    <p:sldLayoutId id="2147483700" r:id="rId10"/>
+    <p:sldLayoutId id="2147483701" r:id="rId11"/>
   </p:sldLayoutIdLst>
   <p:txStyles>
     <p:titleStyle>
@@ -3630,7 +3630,7 @@
           <p:cNvPr id="2" name="Title 1">
             <a:extLst>
               <a:ext uri="{FF2B5EF4-FFF2-40B4-BE49-F238E27FC236}">
-                <a16:creationId xmlns:a16="http://schemas.microsoft.com/office/drawing/2014/main" id="{4DE08930-B1F3-9580-5A41-FA20B9F8A517}"/>
+                <a16:creationId xmlns:a16="http://schemas.microsoft.com/office/drawing/2014/main" id="{AC10EDF4-686F-F8EB-286F-3FC8FB789068}"/>
               </a:ext>
             </a:extLst>
           </p:cNvPr>
@@ -3655,7 +3655,7 @@
           <p:cNvPr id="3" name="Subtitle 2">
             <a:extLst>
               <a:ext uri="{FF2B5EF4-FFF2-40B4-BE49-F238E27FC236}">
-                <a16:creationId xmlns:a16="http://schemas.microsoft.com/office/drawing/2014/main" id="{105BC44C-7424-1410-6FA6-68B5CD87FB9D}"/>
+                <a16:creationId xmlns:a16="http://schemas.microsoft.com/office/drawing/2014/main" id="{D29FF052-96FD-5FE1-B187-2C0A35ACF5CA}"/>
               </a:ext>
             </a:extLst>
           </p:cNvPr>
@@ -3678,7 +3678,7 @@
     </p:spTree>
     <p:extLst>
       <p:ext uri="{BB962C8B-B14F-4D97-AF65-F5344CB8AC3E}">
-        <p14:creationId xmlns:p14="http://schemas.microsoft.com/office/powerpoint/2010/main" val="1374697320"/>
+        <p14:creationId xmlns:p14="http://schemas.microsoft.com/office/powerpoint/2010/main" val="1947262446"/>
       </p:ext>
     </p:extLst>
   </p:cSld>
@@ -3935,7 +3935,7 @@
   <a:extraClrSchemeLst/>
   <a:extLst>
     <a:ext uri="{05A4C25C-085E-4340-85A3-A5531E510DB2}">
-      <thm15:themeFamily xmlns:thm15="http://schemas.microsoft.com/office/thememl/2012/main" name="theme1.potx" id="{CBC0CEDA-6A0C-4E2D-9BBB-C24AC6F66552}" vid="{B3D4B482-D8DF-4859-A214-6D2FA93951AB}"/>
+      <thm15:themeFamily xmlns:thm15="http://schemas.microsoft.com/office/thememl/2012/main" name="Gallery" id="{BBFCD31E-59A1-489D-B089-A3EAD7CAE12E}" vid="{F5E91637-A7B6-4E27-B710-77DA7014EE1E}"/>
     </a:ext>
   </a:extLst>
 </a:theme>

</xml_diff>

<commit_message>
point of adding images in left and right and full image slide
</commit_message>
<xml_diff>
--- a/themes/theme1.pptx
+++ b/themes/theme1.pptx
@@ -251,7 +251,7 @@
           <a:p>
             <a:fld id="{AA69BB30-8325-4345-8DFA-998A30CB2488}" type="datetimeFigureOut">
               <a:rPr lang="en-US" smtClean="0"/>
-              <a:t>9/11/2025</a:t>
+              <a:t>9/15/2025</a:t>
             </a:fld>
             <a:endParaRPr lang="en-US"/>
           </a:p>
@@ -462,7 +462,7 @@
           <a:p>
             <a:fld id="{AA69BB30-8325-4345-8DFA-998A30CB2488}" type="datetimeFigureOut">
               <a:rPr lang="en-US" smtClean="0"/>
-              <a:t>9/11/2025</a:t>
+              <a:t>9/15/2025</a:t>
             </a:fld>
             <a:endParaRPr lang="en-US"/>
           </a:p>
@@ -677,7 +677,7 @@
           <a:p>
             <a:fld id="{AA69BB30-8325-4345-8DFA-998A30CB2488}" type="datetimeFigureOut">
               <a:rPr lang="en-US" smtClean="0"/>
-              <a:t>9/11/2025</a:t>
+              <a:t>9/15/2025</a:t>
             </a:fld>
             <a:endParaRPr lang="en-US"/>
           </a:p>
@@ -878,7 +878,7 @@
           <a:p>
             <a:fld id="{AA69BB30-8325-4345-8DFA-998A30CB2488}" type="datetimeFigureOut">
               <a:rPr lang="en-US" smtClean="0"/>
-              <a:t>9/11/2025</a:t>
+              <a:t>9/15/2025</a:t>
             </a:fld>
             <a:endParaRPr lang="en-US"/>
           </a:p>
@@ -1157,7 +1157,7 @@
           <a:p>
             <a:fld id="{AA69BB30-8325-4345-8DFA-998A30CB2488}" type="datetimeFigureOut">
               <a:rPr lang="en-US" smtClean="0"/>
-              <a:t>9/11/2025</a:t>
+              <a:t>9/15/2025</a:t>
             </a:fld>
             <a:endParaRPr lang="en-US"/>
           </a:p>
@@ -1425,7 +1425,7 @@
           <a:p>
             <a:fld id="{AA69BB30-8325-4345-8DFA-998A30CB2488}" type="datetimeFigureOut">
               <a:rPr lang="en-US" smtClean="0"/>
-              <a:t>9/11/2025</a:t>
+              <a:t>9/15/2025</a:t>
             </a:fld>
             <a:endParaRPr lang="en-US"/>
           </a:p>
@@ -1841,7 +1841,7 @@
           <a:p>
             <a:fld id="{AA69BB30-8325-4345-8DFA-998A30CB2488}" type="datetimeFigureOut">
               <a:rPr lang="en-US" smtClean="0"/>
-              <a:t>9/11/2025</a:t>
+              <a:t>9/15/2025</a:t>
             </a:fld>
             <a:endParaRPr lang="en-US"/>
           </a:p>
@@ -1990,7 +1990,7 @@
           <a:p>
             <a:fld id="{AA69BB30-8325-4345-8DFA-998A30CB2488}" type="datetimeFigureOut">
               <a:rPr lang="en-US" smtClean="0"/>
-              <a:t>9/11/2025</a:t>
+              <a:t>9/15/2025</a:t>
             </a:fld>
             <a:endParaRPr lang="en-US"/>
           </a:p>
@@ -2116,7 +2116,7 @@
           <a:p>
             <a:fld id="{AA69BB30-8325-4345-8DFA-998A30CB2488}" type="datetimeFigureOut">
               <a:rPr lang="en-US" smtClean="0"/>
-              <a:t>9/11/2025</a:t>
+              <a:t>9/15/2025</a:t>
             </a:fld>
             <a:endParaRPr lang="en-US"/>
           </a:p>
@@ -2367,7 +2367,7 @@
           <a:p>
             <a:fld id="{AA69BB30-8325-4345-8DFA-998A30CB2488}" type="datetimeFigureOut">
               <a:rPr lang="en-US" smtClean="0"/>
-              <a:t>9/11/2025</a:t>
+              <a:t>9/15/2025</a:t>
             </a:fld>
             <a:endParaRPr lang="en-US"/>
           </a:p>
@@ -2812,7 +2812,7 @@
           <a:p>
             <a:fld id="{AA69BB30-8325-4345-8DFA-998A30CB2488}" type="datetimeFigureOut">
               <a:rPr lang="en-US" smtClean="0"/>
-              <a:t>9/11/2025</a:t>
+              <a:t>9/15/2025</a:t>
             </a:fld>
             <a:endParaRPr lang="en-US"/>
           </a:p>
@@ -3139,7 +3139,7 @@
           <a:p>
             <a:fld id="{AA69BB30-8325-4345-8DFA-998A30CB2488}" type="datetimeFigureOut">
               <a:rPr lang="en-US" smtClean="0"/>
-              <a:t>9/11/2025</a:t>
+              <a:t>9/15/2025</a:t>
             </a:fld>
             <a:endParaRPr lang="en-US"/>
           </a:p>
@@ -3611,6 +3611,30 @@
 <file path=ppt/slides/slide1.xml><?xml version="1.0" encoding="utf-8"?>
 <p:sld xmlns:a="http://schemas.openxmlformats.org/drawingml/2006/main" xmlns:r="http://schemas.openxmlformats.org/officeDocument/2006/relationships" xmlns:p="http://schemas.openxmlformats.org/presentationml/2006/main">
   <p:cSld>
+    <p:bg>
+      <p:bgPr>
+        <a:gradFill rotWithShape="1">
+          <a:gsLst>
+            <a:gs pos="0">
+              <a:schemeClr val="bg2">
+                <a:tint val="94000"/>
+                <a:satMod val="80000"/>
+                <a:lumMod val="106000"/>
+              </a:schemeClr>
+            </a:gs>
+            <a:gs pos="100000">
+              <a:schemeClr val="bg2">
+                <a:shade val="80000"/>
+              </a:schemeClr>
+            </a:gs>
+          </a:gsLst>
+          <a:path path="circle">
+            <a:fillToRect l="43000" r="43000" b="100000"/>
+          </a:path>
+        </a:gradFill>
+        <a:effectLst/>
+      </p:bgPr>
+    </p:bg>
     <p:spTree>
       <p:nvGrpSpPr>
         <p:cNvPr id="1" name=""/>
@@ -3625,6 +3649,106 @@
           <a:chExt cx="0" cy="0"/>
         </a:xfrm>
       </p:grpSpPr>
+      <p:pic>
+        <p:nvPicPr>
+          <p:cNvPr id="5" name="Picture 4" descr="A child holding a phone to his ear&#10;&#10;AI-generated content may be incorrect.">
+            <a:extLst>
+              <a:ext uri="{FF2B5EF4-FFF2-40B4-BE49-F238E27FC236}">
+                <a16:creationId xmlns:a16="http://schemas.microsoft.com/office/drawing/2014/main" id="{200D8C4D-5A6D-D492-B557-684B92CEF7D0}"/>
+              </a:ext>
+            </a:extLst>
+          </p:cNvPr>
+          <p:cNvPicPr>
+            <a:picLocks noChangeAspect="1"/>
+          </p:cNvPicPr>
+          <p:nvPr/>
+        </p:nvPicPr>
+        <p:blipFill>
+          <a:blip r:embed="rId2">
+            <a:extLst>
+              <a:ext uri="{28A0092B-C50C-407E-A947-70E740481C1C}">
+                <a14:useLocalDpi xmlns:a14="http://schemas.microsoft.com/office/drawing/2010/main" val="0"/>
+              </a:ext>
+            </a:extLst>
+          </a:blip>
+          <a:srcRect t="18447" r="1" b="54131"/>
+          <a:stretch>
+            <a:fillRect/>
+          </a:stretch>
+        </p:blipFill>
+        <p:spPr>
+          <a:xfrm>
+            <a:off x="2" y="10"/>
+            <a:ext cx="12191695" cy="6857990"/>
+          </a:xfrm>
+          <a:prstGeom prst="rect">
+            <a:avLst/>
+          </a:prstGeom>
+        </p:spPr>
+      </p:pic>
+      <p:sp>
+        <p:nvSpPr>
+          <p:cNvPr id="10" name="Rectangle 9">
+            <a:extLst>
+              <a:ext uri="{FF2B5EF4-FFF2-40B4-BE49-F238E27FC236}">
+                <a16:creationId xmlns:a16="http://schemas.microsoft.com/office/drawing/2014/main" id="{6A0FFA78-985C-4F50-B21A-77045C7DF657}"/>
+              </a:ext>
+              <a:ext uri="{C183D7F6-B498-43B3-948B-1728B52AA6E4}">
+                <adec:decorative xmlns:adec="http://schemas.microsoft.com/office/drawing/2017/decorative" val="1"/>
+              </a:ext>
+            </a:extLst>
+          </p:cNvPr>
+          <p:cNvSpPr>
+            <a:spLocks noGrp="1" noRot="1" noChangeAspect="1" noMove="1" noResize="1" noEditPoints="1" noAdjustHandles="1" noChangeArrowheads="1" noChangeShapeType="1" noTextEdit="1"/>
+          </p:cNvSpPr>
+          <p:nvPr>
+            <p:extLst>
+              <p:ext uri="{386F3935-93C4-4BCD-93E2-E3B085C9AB24}">
+                <p16:designElem xmlns:p16="http://schemas.microsoft.com/office/powerpoint/2015/main" val="1"/>
+              </p:ext>
+            </p:extLst>
+          </p:nvPr>
+        </p:nvSpPr>
+        <p:spPr>
+          <a:xfrm>
+            <a:off x="3896786" y="3064931"/>
+            <a:ext cx="8295215" cy="2488568"/>
+          </a:xfrm>
+          <a:prstGeom prst="rect">
+            <a:avLst/>
+          </a:prstGeom>
+          <a:solidFill>
+            <a:srgbClr val="000001">
+              <a:alpha val="75000"/>
+            </a:srgbClr>
+          </a:solidFill>
+          <a:ln>
+            <a:noFill/>
+          </a:ln>
+        </p:spPr>
+        <p:style>
+          <a:lnRef idx="1">
+            <a:schemeClr val="accent1"/>
+          </a:lnRef>
+          <a:fillRef idx="3">
+            <a:schemeClr val="accent1"/>
+          </a:fillRef>
+          <a:effectRef idx="2">
+            <a:schemeClr val="accent1"/>
+          </a:effectRef>
+          <a:fontRef idx="minor">
+            <a:schemeClr val="lt1"/>
+          </a:fontRef>
+        </p:style>
+        <p:txBody>
+          <a:bodyPr rtlCol="0" anchor="ctr"/>
+          <a:lstStyle/>
+          <a:p>
+            <a:pPr algn="ctr"/>
+            <a:endParaRPr lang="en-US"/>
+          </a:p>
+        </p:txBody>
+      </p:sp>
       <p:sp>
         <p:nvSpPr>
           <p:cNvPr id="2" name="Title 1">
@@ -3641,12 +3765,23 @@
             <p:ph type="ctrTitle"/>
           </p:nvPr>
         </p:nvSpPr>
-        <p:spPr/>
-        <p:txBody>
-          <a:bodyPr/>
-          <a:lstStyle/>
-          <a:p>
-            <a:endParaRPr lang="en-US"/>
+        <p:spPr>
+          <a:xfrm>
+            <a:off x="4065511" y="3236470"/>
+            <a:ext cx="6832500" cy="1252601"/>
+          </a:xfrm>
+        </p:spPr>
+        <p:txBody>
+          <a:bodyPr>
+            <a:normAutofit/>
+          </a:bodyPr>
+          <a:lstStyle/>
+          <a:p>
+            <a:endParaRPr lang="en-US" sz="4400">
+              <a:solidFill>
+                <a:srgbClr val="FFFFFE"/>
+              </a:solidFill>
+            </a:endParaRPr>
           </a:p>
         </p:txBody>
       </p:sp>
@@ -3666,15 +3801,78 @@
             <p:ph type="subTitle" idx="1"/>
           </p:nvPr>
         </p:nvSpPr>
-        <p:spPr/>
-        <p:txBody>
-          <a:bodyPr/>
-          <a:lstStyle/>
-          <a:p>
-            <a:endParaRPr lang="en-US"/>
-          </a:p>
-        </p:txBody>
-      </p:sp>
+        <p:spPr>
+          <a:xfrm>
+            <a:off x="4065511" y="4669144"/>
+            <a:ext cx="6832499" cy="716529"/>
+          </a:xfrm>
+        </p:spPr>
+        <p:txBody>
+          <a:bodyPr>
+            <a:normAutofit/>
+          </a:bodyPr>
+          <a:lstStyle/>
+          <a:p>
+            <a:endParaRPr lang="en-US" sz="1600">
+              <a:solidFill>
+                <a:srgbClr val="FFFFFE"/>
+              </a:solidFill>
+            </a:endParaRPr>
+          </a:p>
+        </p:txBody>
+      </p:sp>
+      <p:cxnSp>
+        <p:nvCxnSpPr>
+          <p:cNvPr id="12" name="Straight Connector 11">
+            <a:extLst>
+              <a:ext uri="{FF2B5EF4-FFF2-40B4-BE49-F238E27FC236}">
+                <a16:creationId xmlns:a16="http://schemas.microsoft.com/office/drawing/2014/main" id="{65409EC7-69B1-45CC-8FB7-1964C1AB6720}"/>
+              </a:ext>
+              <a:ext uri="{C183D7F6-B498-43B3-948B-1728B52AA6E4}">
+                <adec:decorative xmlns:adec="http://schemas.microsoft.com/office/drawing/2017/decorative" val="1"/>
+              </a:ext>
+            </a:extLst>
+          </p:cNvPr>
+          <p:cNvCxnSpPr>
+            <a:cxnSpLocks noGrp="1" noRot="1" noChangeAspect="1" noMove="1" noResize="1" noEditPoints="1" noAdjustHandles="1" noChangeArrowheads="1" noChangeShapeType="1"/>
+          </p:cNvCxnSpPr>
+          <p:nvPr>
+            <p:extLst>
+              <p:ext uri="{386F3935-93C4-4BCD-93E2-E3B085C9AB24}">
+                <p16:designElem xmlns:p16="http://schemas.microsoft.com/office/powerpoint/2015/main" val="1"/>
+              </p:ext>
+            </p:extLst>
+          </p:nvPr>
+        </p:nvCxnSpPr>
+        <p:spPr>
+          <a:xfrm>
+            <a:off x="4065509" y="4666480"/>
+            <a:ext cx="6832499" cy="0"/>
+          </a:xfrm>
+          <a:prstGeom prst="line">
+            <a:avLst/>
+          </a:prstGeom>
+          <a:ln w="31750">
+            <a:solidFill>
+              <a:srgbClr val="DDAE63"/>
+            </a:solidFill>
+          </a:ln>
+        </p:spPr>
+        <p:style>
+          <a:lnRef idx="3">
+            <a:schemeClr val="accent1"/>
+          </a:lnRef>
+          <a:fillRef idx="0">
+            <a:schemeClr val="accent1"/>
+          </a:fillRef>
+          <a:effectRef idx="2">
+            <a:schemeClr val="accent1"/>
+          </a:effectRef>
+          <a:fontRef idx="minor">
+            <a:schemeClr val="tx1"/>
+          </a:fontRef>
+        </p:style>
+      </p:cxnSp>
     </p:spTree>
     <p:extLst>
       <p:ext uri="{BB962C8B-B14F-4D97-AF65-F5344CB8AC3E}">

</xml_diff>